<commit_message>
remove errors and update notebook to latest varaibles names
</commit_message>
<xml_diff>
--- a/SSE25-Semaine7-FerraraJustin-slides.pptx
+++ b/SSE25-Semaine7-FerraraJustin-slides.pptx
@@ -5,10 +5,10 @@
     <p:sldMasterId id="2147483648" r:id="rId1"/>
   </p:sldMasterIdLst>
   <p:notesMasterIdLst>
-    <p:notesMasterId r:id="rId40"/>
+    <p:notesMasterId r:id="rId42"/>
   </p:notesMasterIdLst>
   <p:handoutMasterIdLst>
-    <p:handoutMasterId r:id="rId41"/>
+    <p:handoutMasterId r:id="rId43"/>
   </p:handoutMasterIdLst>
   <p:sldIdLst>
     <p:sldId id="256" r:id="rId2"/>
@@ -45,10 +45,12 @@
     <p:sldId id="268" r:id="rId33"/>
     <p:sldId id="280" r:id="rId34"/>
     <p:sldId id="281" r:id="rId35"/>
-    <p:sldId id="269" r:id="rId36"/>
-    <p:sldId id="297" r:id="rId37"/>
-    <p:sldId id="296" r:id="rId38"/>
-    <p:sldId id="270" r:id="rId39"/>
+    <p:sldId id="301" r:id="rId36"/>
+    <p:sldId id="269" r:id="rId37"/>
+    <p:sldId id="302" r:id="rId38"/>
+    <p:sldId id="297" r:id="rId39"/>
+    <p:sldId id="296" r:id="rId40"/>
+    <p:sldId id="270" r:id="rId41"/>
   </p:sldIdLst>
   <p:sldSz cx="12192000" cy="6858000"/>
   <p:notesSz cx="6858000" cy="9144000"/>
@@ -249,7 +251,7 @@
           <a:p>
             <a:fld id="{E119955A-8F8B-4836-9D5D-75BC53B05DFA}" type="datetimeFigureOut">
               <a:rPr lang="fr-CH" smtClean="0"/>
-              <a:t>31.03.2025</a:t>
+              <a:t>01.04.2025</a:t>
             </a:fld>
             <a:endParaRPr lang="fr-CH"/>
           </a:p>
@@ -426,7 +428,7 @@
           <a:p>
             <a:fld id="{4B7F84FC-00BA-4296-9B1E-E241E38FBA94}" type="datetimeFigureOut">
               <a:rPr lang="fr-CH" smtClean="0"/>
-              <a:t>31.03.2025</a:t>
+              <a:t>01.04.2025</a:t>
             </a:fld>
             <a:endParaRPr lang="fr-CH"/>
           </a:p>
@@ -1048,7 +1050,7 @@
           <a:p>
             <a:r>
               <a:rPr lang="fr-CH" dirty="0"/>
-              <a:t>À savoir que il est possible de récupérer des signatures TLS1.2 en écoutant le canal de manière passive (chiffrement effectué après).</a:t>
+              <a:t>Colonnes sont les vecteurs de bases</a:t>
             </a:r>
           </a:p>
         </p:txBody>
@@ -1070,7 +1072,402 @@
           <a:p>
             <a:fld id="{AB99ADB5-010F-40A1-986F-327E4781DD7E}" type="slidenum">
               <a:rPr lang="fr-CH" smtClean="0"/>
+              <a:t>31</a:t>
+            </a:fld>
+            <a:endParaRPr lang="fr-CH"/>
+          </a:p>
+        </p:txBody>
+      </p:sp>
+    </p:spTree>
+    <p:extLst>
+      <p:ext uri="{BB962C8B-B14F-4D97-AF65-F5344CB8AC3E}">
+        <p14:creationId xmlns:p14="http://schemas.microsoft.com/office/powerpoint/2010/main" val="2878425503"/>
+      </p:ext>
+    </p:extLst>
+  </p:cSld>
+  <p:clrMapOvr>
+    <a:masterClrMapping/>
+  </p:clrMapOvr>
+</p:notes>
+</file>
+
+<file path=ppt/notesSlides/notesSlide5.xml><?xml version="1.0" encoding="utf-8"?>
+<p:notes xmlns:a="http://schemas.openxmlformats.org/drawingml/2006/main" xmlns:r="http://schemas.openxmlformats.org/officeDocument/2006/relationships" xmlns:p="http://schemas.openxmlformats.org/presentationml/2006/main">
+  <p:cSld>
+    <p:spTree>
+      <p:nvGrpSpPr>
+        <p:cNvPr id="1" name=""/>
+        <p:cNvGrpSpPr/>
+        <p:nvPr/>
+      </p:nvGrpSpPr>
+      <p:grpSpPr>
+        <a:xfrm>
+          <a:off x="0" y="0"/>
+          <a:ext cx="0" cy="0"/>
+          <a:chOff x="0" y="0"/>
+          <a:chExt cx="0" cy="0"/>
+        </a:xfrm>
+      </p:grpSpPr>
+      <p:sp>
+        <p:nvSpPr>
+          <p:cNvPr id="2" name="Espace réservé de l'image des diapositives 1"/>
+          <p:cNvSpPr>
+            <a:spLocks noGrp="1" noRot="1" noChangeAspect="1"/>
+          </p:cNvSpPr>
+          <p:nvPr>
+            <p:ph type="sldImg"/>
+          </p:nvPr>
+        </p:nvSpPr>
+        <p:spPr/>
+      </p:sp>
+      <p:sp>
+        <p:nvSpPr>
+          <p:cNvPr id="3" name="Espace réservé des notes 2"/>
+          <p:cNvSpPr>
+            <a:spLocks noGrp="1"/>
+          </p:cNvSpPr>
+          <p:nvPr>
+            <p:ph type="body" idx="1"/>
+          </p:nvPr>
+        </p:nvSpPr>
+        <p:spPr/>
+        <p:txBody>
+          <a:bodyPr/>
+          <a:lstStyle/>
+          <a:p>
+            <a:pPr marL="171450" indent="-171450">
+              <a:buFontTx/>
+              <a:buChar char="-"/>
+            </a:pPr>
+            <a:r>
+              <a:rPr lang="fr-CH" dirty="0"/>
+              <a:t>Réduire les coefficients des vecteurs (colonnes)</a:t>
+            </a:r>
+          </a:p>
+          <a:p>
+            <a:pPr marL="171450" indent="-171450">
+              <a:buFontTx/>
+              <a:buChar char="-"/>
+            </a:pPr>
+            <a:r>
+              <a:rPr lang="fr-FR" b="0" dirty="0"/>
+              <a:t>Remplacer les vecteurs de la base par d'autres vecteurs plus courts</a:t>
+            </a:r>
+            <a:r>
+              <a:rPr lang="fr-FR" dirty="0"/>
+              <a:t> qui engendrent toujours le même réseau</a:t>
+            </a:r>
+          </a:p>
+          <a:p>
+            <a:pPr marL="171450" indent="-171450">
+              <a:buFontTx/>
+              <a:buChar char="-"/>
+            </a:pPr>
+            <a:r>
+              <a:rPr lang="fr-FR" b="0" dirty="0"/>
+              <a:t>Les vecteurs d’une base peuvent être très inclinés les uns par rapport aux autres. LLL tente de rendre les vecteurs plus orthogonaux (angles droits) en réduisant leurs angles, ce qui facilite les calculs et l'analyse du réseau.</a:t>
+            </a:r>
+            <a:endParaRPr lang="fr-CH" b="0" dirty="0"/>
+          </a:p>
+        </p:txBody>
+      </p:sp>
+      <p:sp>
+        <p:nvSpPr>
+          <p:cNvPr id="4" name="Espace réservé du numéro de diapositive 3"/>
+          <p:cNvSpPr>
+            <a:spLocks noGrp="1"/>
+          </p:cNvSpPr>
+          <p:nvPr>
+            <p:ph type="sldNum" sz="quarter" idx="5"/>
+          </p:nvPr>
+        </p:nvSpPr>
+        <p:spPr/>
+        <p:txBody>
+          <a:bodyPr/>
+          <a:lstStyle/>
+          <a:p>
+            <a:fld id="{AB99ADB5-010F-40A1-986F-327E4781DD7E}" type="slidenum">
+              <a:rPr lang="fr-CH" smtClean="0"/>
+              <a:t>32</a:t>
+            </a:fld>
+            <a:endParaRPr lang="fr-CH"/>
+          </a:p>
+        </p:txBody>
+      </p:sp>
+    </p:spTree>
+    <p:extLst>
+      <p:ext uri="{BB962C8B-B14F-4D97-AF65-F5344CB8AC3E}">
+        <p14:creationId xmlns:p14="http://schemas.microsoft.com/office/powerpoint/2010/main" val="1420911082"/>
+      </p:ext>
+    </p:extLst>
+  </p:cSld>
+  <p:clrMapOvr>
+    <a:masterClrMapping/>
+  </p:clrMapOvr>
+</p:notes>
+</file>
+
+<file path=ppt/notesSlides/notesSlide6.xml><?xml version="1.0" encoding="utf-8"?>
+<p:notes xmlns:a="http://schemas.openxmlformats.org/drawingml/2006/main" xmlns:r="http://schemas.openxmlformats.org/officeDocument/2006/relationships" xmlns:p="http://schemas.openxmlformats.org/presentationml/2006/main">
+  <p:cSld>
+    <p:spTree>
+      <p:nvGrpSpPr>
+        <p:cNvPr id="1" name=""/>
+        <p:cNvGrpSpPr/>
+        <p:nvPr/>
+      </p:nvGrpSpPr>
+      <p:grpSpPr>
+        <a:xfrm>
+          <a:off x="0" y="0"/>
+          <a:ext cx="0" cy="0"/>
+          <a:chOff x="0" y="0"/>
+          <a:chExt cx="0" cy="0"/>
+        </a:xfrm>
+      </p:grpSpPr>
+      <p:sp>
+        <p:nvSpPr>
+          <p:cNvPr id="2" name="Espace réservé de l'image des diapositives 1"/>
+          <p:cNvSpPr>
+            <a:spLocks noGrp="1" noRot="1" noChangeAspect="1"/>
+          </p:cNvSpPr>
+          <p:nvPr>
+            <p:ph type="sldImg"/>
+          </p:nvPr>
+        </p:nvSpPr>
+        <p:spPr/>
+      </p:sp>
+      <p:sp>
+        <p:nvSpPr>
+          <p:cNvPr id="3" name="Espace réservé des notes 2"/>
+          <p:cNvSpPr>
+            <a:spLocks noGrp="1"/>
+          </p:cNvSpPr>
+          <p:nvPr>
+            <p:ph type="body" idx="1"/>
+          </p:nvPr>
+        </p:nvSpPr>
+        <p:spPr/>
+        <p:txBody>
+          <a:bodyPr/>
+          <a:lstStyle/>
+          <a:p>
+            <a:endParaRPr lang="fr-CH" dirty="0"/>
+          </a:p>
+        </p:txBody>
+      </p:sp>
+      <p:sp>
+        <p:nvSpPr>
+          <p:cNvPr id="4" name="Espace réservé du numéro de diapositive 3"/>
+          <p:cNvSpPr>
+            <a:spLocks noGrp="1"/>
+          </p:cNvSpPr>
+          <p:nvPr>
+            <p:ph type="sldNum" sz="quarter" idx="5"/>
+          </p:nvPr>
+        </p:nvSpPr>
+        <p:spPr/>
+        <p:txBody>
+          <a:bodyPr/>
+          <a:lstStyle/>
+          <a:p>
+            <a:fld id="{AB99ADB5-010F-40A1-986F-327E4781DD7E}" type="slidenum">
+              <a:rPr lang="fr-CH" smtClean="0"/>
               <a:t>36</a:t>
+            </a:fld>
+            <a:endParaRPr lang="fr-CH"/>
+          </a:p>
+        </p:txBody>
+      </p:sp>
+    </p:spTree>
+    <p:extLst>
+      <p:ext uri="{BB962C8B-B14F-4D97-AF65-F5344CB8AC3E}">
+        <p14:creationId xmlns:p14="http://schemas.microsoft.com/office/powerpoint/2010/main" val="1976026717"/>
+      </p:ext>
+    </p:extLst>
+  </p:cSld>
+  <p:clrMapOvr>
+    <a:masterClrMapping/>
+  </p:clrMapOvr>
+</p:notes>
+</file>
+
+<file path=ppt/notesSlides/notesSlide7.xml><?xml version="1.0" encoding="utf-8"?>
+<p:notes xmlns:a="http://schemas.openxmlformats.org/drawingml/2006/main" xmlns:r="http://schemas.openxmlformats.org/officeDocument/2006/relationships" xmlns:p="http://schemas.openxmlformats.org/presentationml/2006/main">
+  <p:cSld>
+    <p:spTree>
+      <p:nvGrpSpPr>
+        <p:cNvPr id="1" name="">
+          <a:extLst>
+            <a:ext uri="{FF2B5EF4-FFF2-40B4-BE49-F238E27FC236}">
+              <a16:creationId xmlns:a16="http://schemas.microsoft.com/office/drawing/2014/main" id="{2287C8E7-AABB-3F27-8B3C-BD0612BA2A50}"/>
+            </a:ext>
+          </a:extLst>
+        </p:cNvPr>
+        <p:cNvGrpSpPr/>
+        <p:nvPr/>
+      </p:nvGrpSpPr>
+      <p:grpSpPr>
+        <a:xfrm>
+          <a:off x="0" y="0"/>
+          <a:ext cx="0" cy="0"/>
+          <a:chOff x="0" y="0"/>
+          <a:chExt cx="0" cy="0"/>
+        </a:xfrm>
+      </p:grpSpPr>
+      <p:sp>
+        <p:nvSpPr>
+          <p:cNvPr id="2" name="Espace réservé de l'image des diapositives 1">
+            <a:extLst>
+              <a:ext uri="{FF2B5EF4-FFF2-40B4-BE49-F238E27FC236}">
+                <a16:creationId xmlns:a16="http://schemas.microsoft.com/office/drawing/2014/main" id="{F4264270-C409-8C35-F715-08F70E4526A9}"/>
+              </a:ext>
+            </a:extLst>
+          </p:cNvPr>
+          <p:cNvSpPr>
+            <a:spLocks noGrp="1" noRot="1" noChangeAspect="1"/>
+          </p:cNvSpPr>
+          <p:nvPr>
+            <p:ph type="sldImg"/>
+          </p:nvPr>
+        </p:nvSpPr>
+        <p:spPr/>
+      </p:sp>
+      <p:sp>
+        <p:nvSpPr>
+          <p:cNvPr id="3" name="Espace réservé des notes 2">
+            <a:extLst>
+              <a:ext uri="{FF2B5EF4-FFF2-40B4-BE49-F238E27FC236}">
+                <a16:creationId xmlns:a16="http://schemas.microsoft.com/office/drawing/2014/main" id="{E3ABF755-F0C2-3C39-3035-FE4E962E6C10}"/>
+              </a:ext>
+            </a:extLst>
+          </p:cNvPr>
+          <p:cNvSpPr>
+            <a:spLocks noGrp="1"/>
+          </p:cNvSpPr>
+          <p:nvPr>
+            <p:ph type="body" idx="1"/>
+          </p:nvPr>
+        </p:nvSpPr>
+        <p:spPr/>
+        <p:txBody>
+          <a:bodyPr/>
+          <a:lstStyle/>
+          <a:p>
+            <a:endParaRPr lang="fr-CH" dirty="0"/>
+          </a:p>
+        </p:txBody>
+      </p:sp>
+      <p:sp>
+        <p:nvSpPr>
+          <p:cNvPr id="4" name="Espace réservé du numéro de diapositive 3">
+            <a:extLst>
+              <a:ext uri="{FF2B5EF4-FFF2-40B4-BE49-F238E27FC236}">
+                <a16:creationId xmlns:a16="http://schemas.microsoft.com/office/drawing/2014/main" id="{6258EB77-FC77-EB48-2FBB-DCCEE9AD2458}"/>
+              </a:ext>
+            </a:extLst>
+          </p:cNvPr>
+          <p:cNvSpPr>
+            <a:spLocks noGrp="1"/>
+          </p:cNvSpPr>
+          <p:nvPr>
+            <p:ph type="sldNum" sz="quarter" idx="5"/>
+          </p:nvPr>
+        </p:nvSpPr>
+        <p:spPr/>
+        <p:txBody>
+          <a:bodyPr/>
+          <a:lstStyle/>
+          <a:p>
+            <a:fld id="{AB99ADB5-010F-40A1-986F-327E4781DD7E}" type="slidenum">
+              <a:rPr lang="fr-CH" smtClean="0"/>
+              <a:t>37</a:t>
+            </a:fld>
+            <a:endParaRPr lang="fr-CH"/>
+          </a:p>
+        </p:txBody>
+      </p:sp>
+    </p:spTree>
+    <p:extLst>
+      <p:ext uri="{BB962C8B-B14F-4D97-AF65-F5344CB8AC3E}">
+        <p14:creationId xmlns:p14="http://schemas.microsoft.com/office/powerpoint/2010/main" val="1442880477"/>
+      </p:ext>
+    </p:extLst>
+  </p:cSld>
+  <p:clrMapOvr>
+    <a:masterClrMapping/>
+  </p:clrMapOvr>
+</p:notes>
+</file>
+
+<file path=ppt/notesSlides/notesSlide8.xml><?xml version="1.0" encoding="utf-8"?>
+<p:notes xmlns:a="http://schemas.openxmlformats.org/drawingml/2006/main" xmlns:r="http://schemas.openxmlformats.org/officeDocument/2006/relationships" xmlns:p="http://schemas.openxmlformats.org/presentationml/2006/main">
+  <p:cSld>
+    <p:spTree>
+      <p:nvGrpSpPr>
+        <p:cNvPr id="1" name=""/>
+        <p:cNvGrpSpPr/>
+        <p:nvPr/>
+      </p:nvGrpSpPr>
+      <p:grpSpPr>
+        <a:xfrm>
+          <a:off x="0" y="0"/>
+          <a:ext cx="0" cy="0"/>
+          <a:chOff x="0" y="0"/>
+          <a:chExt cx="0" cy="0"/>
+        </a:xfrm>
+      </p:grpSpPr>
+      <p:sp>
+        <p:nvSpPr>
+          <p:cNvPr id="2" name="Espace réservé de l'image des diapositives 1"/>
+          <p:cNvSpPr>
+            <a:spLocks noGrp="1" noRot="1" noChangeAspect="1"/>
+          </p:cNvSpPr>
+          <p:nvPr>
+            <p:ph type="sldImg"/>
+          </p:nvPr>
+        </p:nvSpPr>
+        <p:spPr/>
+      </p:sp>
+      <p:sp>
+        <p:nvSpPr>
+          <p:cNvPr id="3" name="Espace réservé des notes 2"/>
+          <p:cNvSpPr>
+            <a:spLocks noGrp="1"/>
+          </p:cNvSpPr>
+          <p:nvPr>
+            <p:ph type="body" idx="1"/>
+          </p:nvPr>
+        </p:nvSpPr>
+        <p:spPr/>
+        <p:txBody>
+          <a:bodyPr/>
+          <a:lstStyle/>
+          <a:p>
+            <a:r>
+              <a:rPr lang="fr-CH" dirty="0"/>
+              <a:t>À savoir que il est possible de récupérer des signatures TLS1.2 en écoutant le canal de manière passive (chiffrement effectué après).</a:t>
+            </a:r>
+          </a:p>
+        </p:txBody>
+      </p:sp>
+      <p:sp>
+        <p:nvSpPr>
+          <p:cNvPr id="4" name="Espace réservé du numéro de diapositive 3"/>
+          <p:cNvSpPr>
+            <a:spLocks noGrp="1"/>
+          </p:cNvSpPr>
+          <p:nvPr>
+            <p:ph type="sldNum" sz="quarter" idx="5"/>
+          </p:nvPr>
+        </p:nvSpPr>
+        <p:spPr/>
+        <p:txBody>
+          <a:bodyPr/>
+          <a:lstStyle/>
+          <a:p>
+            <a:fld id="{AB99ADB5-010F-40A1-986F-327E4781DD7E}" type="slidenum">
+              <a:rPr lang="fr-CH" smtClean="0"/>
+              <a:t>38</a:t>
             </a:fld>
             <a:endParaRPr lang="fr-CH"/>
           </a:p>
@@ -1238,7 +1635,7 @@
           <a:p>
             <a:fld id="{F57DD76F-4C7B-46A7-B9DC-35AD90C344BA}" type="datetimeFigureOut">
               <a:rPr lang="fr-CH" smtClean="0"/>
-              <a:t>31.03.2025</a:t>
+              <a:t>01.04.2025</a:t>
             </a:fld>
             <a:endParaRPr lang="fr-CH"/>
           </a:p>
@@ -1438,7 +1835,7 @@
           <a:p>
             <a:fld id="{F57DD76F-4C7B-46A7-B9DC-35AD90C344BA}" type="datetimeFigureOut">
               <a:rPr lang="fr-CH" smtClean="0"/>
-              <a:t>31.03.2025</a:t>
+              <a:t>01.04.2025</a:t>
             </a:fld>
             <a:endParaRPr lang="fr-CH"/>
           </a:p>
@@ -1648,7 +2045,7 @@
           <a:p>
             <a:fld id="{F57DD76F-4C7B-46A7-B9DC-35AD90C344BA}" type="datetimeFigureOut">
               <a:rPr lang="fr-CH" smtClean="0"/>
-              <a:t>31.03.2025</a:t>
+              <a:t>01.04.2025</a:t>
             </a:fld>
             <a:endParaRPr lang="fr-CH"/>
           </a:p>
@@ -1848,7 +2245,7 @@
           <a:p>
             <a:fld id="{F57DD76F-4C7B-46A7-B9DC-35AD90C344BA}" type="datetimeFigureOut">
               <a:rPr lang="fr-CH" smtClean="0"/>
-              <a:t>31.03.2025</a:t>
+              <a:t>01.04.2025</a:t>
             </a:fld>
             <a:endParaRPr lang="fr-CH"/>
           </a:p>
@@ -2124,7 +2521,7 @@
           <a:p>
             <a:fld id="{F57DD76F-4C7B-46A7-B9DC-35AD90C344BA}" type="datetimeFigureOut">
               <a:rPr lang="fr-CH" smtClean="0"/>
-              <a:t>31.03.2025</a:t>
+              <a:t>01.04.2025</a:t>
             </a:fld>
             <a:endParaRPr lang="fr-CH"/>
           </a:p>
@@ -2392,7 +2789,7 @@
           <a:p>
             <a:fld id="{F57DD76F-4C7B-46A7-B9DC-35AD90C344BA}" type="datetimeFigureOut">
               <a:rPr lang="fr-CH" smtClean="0"/>
-              <a:t>31.03.2025</a:t>
+              <a:t>01.04.2025</a:t>
             </a:fld>
             <a:endParaRPr lang="fr-CH"/>
           </a:p>
@@ -2807,7 +3204,7 @@
           <a:p>
             <a:fld id="{F57DD76F-4C7B-46A7-B9DC-35AD90C344BA}" type="datetimeFigureOut">
               <a:rPr lang="fr-CH" smtClean="0"/>
-              <a:t>31.03.2025</a:t>
+              <a:t>01.04.2025</a:t>
             </a:fld>
             <a:endParaRPr lang="fr-CH"/>
           </a:p>
@@ -2949,7 +3346,7 @@
           <a:p>
             <a:fld id="{F57DD76F-4C7B-46A7-B9DC-35AD90C344BA}" type="datetimeFigureOut">
               <a:rPr lang="fr-CH" smtClean="0"/>
-              <a:t>31.03.2025</a:t>
+              <a:t>01.04.2025</a:t>
             </a:fld>
             <a:endParaRPr lang="fr-CH"/>
           </a:p>
@@ -3062,7 +3459,7 @@
           <a:p>
             <a:fld id="{F57DD76F-4C7B-46A7-B9DC-35AD90C344BA}" type="datetimeFigureOut">
               <a:rPr lang="fr-CH" smtClean="0"/>
-              <a:t>31.03.2025</a:t>
+              <a:t>01.04.2025</a:t>
             </a:fld>
             <a:endParaRPr lang="fr-CH"/>
           </a:p>
@@ -3375,7 +3772,7 @@
           <a:p>
             <a:fld id="{F57DD76F-4C7B-46A7-B9DC-35AD90C344BA}" type="datetimeFigureOut">
               <a:rPr lang="fr-CH" smtClean="0"/>
-              <a:t>31.03.2025</a:t>
+              <a:t>01.04.2025</a:t>
             </a:fld>
             <a:endParaRPr lang="fr-CH"/>
           </a:p>
@@ -3664,7 +4061,7 @@
           <a:p>
             <a:fld id="{F57DD76F-4C7B-46A7-B9DC-35AD90C344BA}" type="datetimeFigureOut">
               <a:rPr lang="fr-CH" smtClean="0"/>
-              <a:t>31.03.2025</a:t>
+              <a:t>01.04.2025</a:t>
             </a:fld>
             <a:endParaRPr lang="fr-CH"/>
           </a:p>
@@ -3907,7 +4304,7 @@
           <a:p>
             <a:fld id="{F57DD76F-4C7B-46A7-B9DC-35AD90C344BA}" type="datetimeFigureOut">
               <a:rPr lang="fr-CH" smtClean="0"/>
-              <a:t>31.03.2025</a:t>
+              <a:t>01.04.2025</a:t>
             </a:fld>
             <a:endParaRPr lang="fr-CH"/>
           </a:p>
@@ -8098,8 +8495,8 @@
           </a:p>
         </p:txBody>
       </p:sp>
-      <mc:AlternateContent xmlns:mc="http://schemas.openxmlformats.org/markup-compatibility/2006">
-        <mc:Choice xmlns:a14="http://schemas.microsoft.com/office/drawing/2010/main" Requires="a14">
+      <mc:AlternateContent xmlns:mc="http://schemas.openxmlformats.org/markup-compatibility/2006" xmlns:a14="http://schemas.microsoft.com/office/drawing/2010/main">
+        <mc:Choice Requires="a14">
           <p:sp>
             <p:nvSpPr>
               <p:cNvPr id="3" name="Espace réservé du contenu 2">
@@ -8623,7 +9020,7 @@
             </p:txBody>
           </p:sp>
         </mc:Choice>
-        <mc:Fallback>
+        <mc:Fallback xmlns="">
           <p:sp>
             <p:nvSpPr>
               <p:cNvPr id="3" name="Espace réservé du contenu 2">
@@ -9074,7 +9471,7 @@
                 <a:latin typeface="Cambria Math" panose="02040503050406030204" pitchFamily="18" charset="0"/>
                 <a:ea typeface="Cambria Math" panose="02040503050406030204" pitchFamily="18" charset="0"/>
               </a:rPr>
-              <a:t>(n, e)</a:t>
+              <a:t>(N, e)</a:t>
             </a:r>
           </a:p>
           <a:p>
@@ -9208,8 +9605,8 @@
           </a:p>
         </p:txBody>
       </p:sp>
-      <mc:AlternateContent xmlns:mc="http://schemas.openxmlformats.org/markup-compatibility/2006" xmlns:a14="http://schemas.microsoft.com/office/drawing/2010/main">
-        <mc:Choice Requires="a14">
+      <mc:AlternateContent xmlns:mc="http://schemas.openxmlformats.org/markup-compatibility/2006">
+        <mc:Choice xmlns:a14="http://schemas.microsoft.com/office/drawing/2010/main" Requires="a14">
           <p:sp>
             <p:nvSpPr>
               <p:cNvPr id="3" name="Espace réservé du contenu 2">
@@ -9531,7 +9928,7 @@
                     </a:highlight>
                     <a:latin typeface="Cambria Math" panose="02040503050406030204" pitchFamily="18" charset="0"/>
                   </a:rPr>
-                  <a:t>Hash(m)</a:t>
+                  <a:t>Hash(m’)</a:t>
                 </a:r>
               </a:p>
               <a:p>
@@ -9543,7 +9940,7 @@
             </p:txBody>
           </p:sp>
         </mc:Choice>
-        <mc:Fallback xmlns="">
+        <mc:Fallback>
           <p:sp>
             <p:nvSpPr>
               <p:cNvPr id="3" name="Espace réservé du contenu 2">
@@ -9699,8 +10096,8 @@
           </a:p>
         </p:txBody>
       </p:sp>
-      <mc:AlternateContent xmlns:mc="http://schemas.openxmlformats.org/markup-compatibility/2006">
-        <mc:Choice xmlns:a14="http://schemas.microsoft.com/office/drawing/2010/main" Requires="a14">
+      <mc:AlternateContent xmlns:mc="http://schemas.openxmlformats.org/markup-compatibility/2006" xmlns:a14="http://schemas.microsoft.com/office/drawing/2010/main">
+        <mc:Choice Requires="a14">
           <p:sp>
             <p:nvSpPr>
               <p:cNvPr id="3" name="Espace réservé du contenu 2">
@@ -9949,7 +10346,7 @@
             </p:txBody>
           </p:sp>
         </mc:Choice>
-        <mc:Fallback>
+        <mc:Fallback xmlns="">
           <p:sp>
             <p:nvSpPr>
               <p:cNvPr id="3" name="Espace réservé du contenu 2">
@@ -10511,7 +10908,7 @@
           <a:p>
             <a:r>
               <a:rPr lang="fr-CH" dirty="0"/>
-              <a:t>Signe un message qui est transmis de manière chiffrée</a:t>
+              <a:t>Signe un message qui n’est pas transmis sur la canal</a:t>
             </a:r>
           </a:p>
           <a:p>
@@ -10642,8 +11039,8 @@
           </a:p>
         </p:txBody>
       </p:sp>
-      <mc:AlternateContent xmlns:mc="http://schemas.openxmlformats.org/markup-compatibility/2006">
-        <mc:Choice xmlns:a14="http://schemas.microsoft.com/office/drawing/2010/main" Requires="a14">
+      <mc:AlternateContent xmlns:mc="http://schemas.openxmlformats.org/markup-compatibility/2006" xmlns:a14="http://schemas.microsoft.com/office/drawing/2010/main">
+        <mc:Choice Requires="a14">
           <p:sp>
             <p:nvSpPr>
               <p:cNvPr id="3" name="Espace réservé du contenu 2">
@@ -10903,13 +11300,7 @@
                         <a:rPr lang="en-GB" b="0" i="1" smtClean="0">
                           <a:latin typeface="Cambria Math" panose="02040503050406030204" pitchFamily="18" charset="0"/>
                         </a:rPr>
-                        <m:t>=</m:t>
-                      </m:r>
-                      <m:r>
-                        <a:rPr lang="en-GB" b="0" i="1" smtClean="0">
-                          <a:latin typeface="Cambria Math" panose="02040503050406030204" pitchFamily="18" charset="0"/>
-                        </a:rPr>
-                        <m:t>(</m:t>
+                        <m:t>=(</m:t>
                       </m:r>
                       <m:r>
                         <a:rPr lang="en-GB" b="0" i="1" smtClean="0">
@@ -10992,7 +11383,7 @@
             </p:txBody>
           </p:sp>
         </mc:Choice>
-        <mc:Fallback>
+        <mc:Fallback xmlns="">
           <p:sp>
             <p:nvSpPr>
               <p:cNvPr id="3" name="Espace réservé du contenu 2">
@@ -11138,8 +11529,8 @@
           </a:p>
         </p:txBody>
       </p:sp>
-      <mc:AlternateContent xmlns:mc="http://schemas.openxmlformats.org/markup-compatibility/2006">
-        <mc:Choice xmlns:a14="http://schemas.microsoft.com/office/drawing/2010/main" Requires="a14">
+      <mc:AlternateContent xmlns:mc="http://schemas.openxmlformats.org/markup-compatibility/2006" xmlns:a14="http://schemas.microsoft.com/office/drawing/2010/main">
+        <mc:Choice Requires="a14">
           <p:sp>
             <p:nvSpPr>
               <p:cNvPr id="3" name="Espace réservé du contenu 2">
@@ -11597,7 +11988,7 @@
             </p:txBody>
           </p:sp>
         </mc:Choice>
-        <mc:Fallback>
+        <mc:Fallback xmlns="">
           <p:sp>
             <p:nvSpPr>
               <p:cNvPr id="3" name="Espace réservé du contenu 2">
@@ -11616,7 +12007,7 @@
             </p:nvSpPr>
             <p:spPr>
               <a:blipFill>
-                <a:blip r:embed="rId2"/>
+                <a:blip r:embed="rId3"/>
                 <a:stretch>
                   <a:fillRect l="-1217"/>
                 </a:stretch>
@@ -11652,7 +12043,7 @@
           <p:nvPr/>
         </p:nvPicPr>
         <p:blipFill>
-          <a:blip r:embed="rId3">
+          <a:blip r:embed="rId4">
             <a:extLst>
               <a:ext uri="{28A0092B-C50C-407E-A947-70E740481C1C}">
                 <a14:useLocalDpi xmlns:a14="http://schemas.microsoft.com/office/drawing/2010/main" val="0"/>
@@ -11879,7 +12270,7 @@
             </p:nvSpPr>
             <p:spPr>
               <a:blipFill>
-                <a:blip r:embed="rId2"/>
+                <a:blip r:embed="rId3"/>
                 <a:stretch>
                   <a:fillRect l="-1043" t="-2381"/>
                 </a:stretch>
@@ -11915,7 +12306,7 @@
           <p:nvPr/>
         </p:nvPicPr>
         <p:blipFill>
-          <a:blip r:embed="rId3">
+          <a:blip r:embed="rId4">
             <a:extLst>
               <a:ext uri="{28A0092B-C50C-407E-A947-70E740481C1C}">
                 <a14:useLocalDpi xmlns:a14="http://schemas.microsoft.com/office/drawing/2010/main" val="0"/>
@@ -12005,8 +12396,8 @@
           </a:p>
         </p:txBody>
       </p:sp>
-      <mc:AlternateContent xmlns:mc="http://schemas.openxmlformats.org/markup-compatibility/2006">
-        <mc:Choice xmlns:a14="http://schemas.microsoft.com/office/drawing/2010/main" Requires="a14">
+      <mc:AlternateContent xmlns:mc="http://schemas.openxmlformats.org/markup-compatibility/2006" xmlns:a14="http://schemas.microsoft.com/office/drawing/2010/main">
+        <mc:Choice Requires="a14">
           <p:sp>
             <p:nvSpPr>
               <p:cNvPr id="3" name="Espace réservé du contenu 2">
@@ -12903,7 +13294,7 @@
             </p:txBody>
           </p:sp>
         </mc:Choice>
-        <mc:Fallback>
+        <mc:Fallback xmlns="">
           <p:sp>
             <p:nvSpPr>
               <p:cNvPr id="3" name="Espace réservé du contenu 2">
@@ -13426,6 +13817,348 @@
   <p:cSld>
     <p:spTree>
       <p:nvGrpSpPr>
+        <p:cNvPr id="1" name="">
+          <a:extLst>
+            <a:ext uri="{FF2B5EF4-FFF2-40B4-BE49-F238E27FC236}">
+              <a16:creationId xmlns:a16="http://schemas.microsoft.com/office/drawing/2014/main" id="{2C44FE71-F1FF-FE46-2956-93C64C034C22}"/>
+            </a:ext>
+          </a:extLst>
+        </p:cNvPr>
+        <p:cNvGrpSpPr/>
+        <p:nvPr/>
+      </p:nvGrpSpPr>
+      <p:grpSpPr>
+        <a:xfrm>
+          <a:off x="0" y="0"/>
+          <a:ext cx="0" cy="0"/>
+          <a:chOff x="0" y="0"/>
+          <a:chExt cx="0" cy="0"/>
+        </a:xfrm>
+      </p:grpSpPr>
+      <p:sp>
+        <p:nvSpPr>
+          <p:cNvPr id="2" name="Titre 1">
+            <a:extLst>
+              <a:ext uri="{FF2B5EF4-FFF2-40B4-BE49-F238E27FC236}">
+                <a16:creationId xmlns:a16="http://schemas.microsoft.com/office/drawing/2014/main" id="{00932BC9-5139-9D39-9B9B-90A534847707}"/>
+              </a:ext>
+            </a:extLst>
+          </p:cNvPr>
+          <p:cNvSpPr>
+            <a:spLocks noGrp="1"/>
+          </p:cNvSpPr>
+          <p:nvPr>
+            <p:ph type="title"/>
+          </p:nvPr>
+        </p:nvSpPr>
+        <p:spPr/>
+        <p:txBody>
+          <a:bodyPr/>
+          <a:lstStyle/>
+          <a:p>
+            <a:r>
+              <a:rPr lang="fr-CH" dirty="0"/>
+              <a:t>Limite</a:t>
+            </a:r>
+          </a:p>
+        </p:txBody>
+      </p:sp>
+      <mc:AlternateContent xmlns:mc="http://schemas.openxmlformats.org/markup-compatibility/2006">
+        <mc:Choice xmlns:a14="http://schemas.microsoft.com/office/drawing/2010/main" Requires="a14">
+          <p:sp>
+            <p:nvSpPr>
+              <p:cNvPr id="3" name="Espace réservé du contenu 2">
+                <a:extLst>
+                  <a:ext uri="{FF2B5EF4-FFF2-40B4-BE49-F238E27FC236}">
+                    <a16:creationId xmlns:a16="http://schemas.microsoft.com/office/drawing/2014/main" id="{6886910B-2FF6-2D05-3121-628D117A0D72}"/>
+                  </a:ext>
+                </a:extLst>
+              </p:cNvPr>
+              <p:cNvSpPr>
+                <a:spLocks noGrp="1"/>
+              </p:cNvSpPr>
+              <p:nvPr>
+                <p:ph idx="1"/>
+              </p:nvPr>
+            </p:nvSpPr>
+            <p:spPr/>
+            <p:txBody>
+              <a:bodyPr/>
+              <a:lstStyle/>
+              <a:p>
+                <a:pPr marL="0" indent="0" algn="ctr">
+                  <a:buNone/>
+                </a:pPr>
+                <a:endParaRPr lang="en-GB" i="1" dirty="0">
+                  <a:latin typeface="Cambria Math" panose="02040503050406030204" pitchFamily="18" charset="0"/>
+                </a:endParaRPr>
+              </a:p>
+              <a:p>
+                <a:pPr marL="0" indent="0" algn="ctr">
+                  <a:buNone/>
+                </a:pPr>
+                <a:endParaRPr lang="en-GB" i="1" dirty="0">
+                  <a:latin typeface="Cambria Math" panose="02040503050406030204" pitchFamily="18" charset="0"/>
+                </a:endParaRPr>
+              </a:p>
+              <a:p>
+                <a:pPr marL="0" indent="0" algn="ctr">
+                  <a:buNone/>
+                </a:pPr>
+                <a14:m>
+                  <m:oMathPara xmlns:m="http://schemas.openxmlformats.org/officeDocument/2006/math">
+                    <m:oMathParaPr>
+                      <m:jc m:val="centerGroup"/>
+                    </m:oMathParaPr>
+                    <m:oMath xmlns:m="http://schemas.openxmlformats.org/officeDocument/2006/math">
+                      <m:func>
+                        <m:funcPr>
+                          <m:ctrlPr>
+                            <a:rPr lang="en-GB" i="1" smtClean="0">
+                              <a:latin typeface="Cambria Math" panose="02040503050406030204" pitchFamily="18" charset="0"/>
+                            </a:rPr>
+                          </m:ctrlPr>
+                        </m:funcPr>
+                        <m:fName>
+                          <m:sSub>
+                            <m:sSubPr>
+                              <m:ctrlPr>
+                                <a:rPr lang="en-GB" i="1" smtClean="0">
+                                  <a:latin typeface="Cambria Math" panose="02040503050406030204" pitchFamily="18" charset="0"/>
+                                </a:rPr>
+                              </m:ctrlPr>
+                            </m:sSubPr>
+                            <m:e>
+                              <m:r>
+                                <m:rPr>
+                                  <m:sty m:val="p"/>
+                                </m:rPr>
+                                <a:rPr lang="en-GB" i="0" smtClean="0">
+                                  <a:latin typeface="Cambria Math" panose="02040503050406030204" pitchFamily="18" charset="0"/>
+                                </a:rPr>
+                                <m:t>log</m:t>
+                              </m:r>
+                            </m:e>
+                            <m:sub>
+                              <m:r>
+                                <a:rPr lang="en-GB" b="0" i="1" smtClean="0">
+                                  <a:latin typeface="Cambria Math" panose="02040503050406030204" pitchFamily="18" charset="0"/>
+                                </a:rPr>
+                                <m:t>2</m:t>
+                              </m:r>
+                            </m:sub>
+                          </m:sSub>
+                        </m:fName>
+                        <m:e>
+                          <m:r>
+                            <a:rPr lang="en-GB" b="0" i="1" smtClean="0">
+                              <a:latin typeface="Cambria Math" panose="02040503050406030204" pitchFamily="18" charset="0"/>
+                            </a:rPr>
+                            <m:t>h</m:t>
+                          </m:r>
+                        </m:e>
+                      </m:func>
+                      <m:r>
+                        <a:rPr lang="en-GB" b="0" i="1" smtClean="0">
+                          <a:latin typeface="Cambria Math" panose="02040503050406030204" pitchFamily="18" charset="0"/>
+                        </a:rPr>
+                        <m:t> </m:t>
+                      </m:r>
+                      <m:r>
+                        <a:rPr lang="en-GB" b="0" i="1" smtClean="0">
+                          <a:latin typeface="Cambria Math" panose="02040503050406030204" pitchFamily="18" charset="0"/>
+                          <a:ea typeface="Cambria Math" panose="02040503050406030204" pitchFamily="18" charset="0"/>
+                        </a:rPr>
+                        <m:t>≤ </m:t>
+                      </m:r>
+                      <m:f>
+                        <m:fPr>
+                          <m:ctrlPr>
+                            <a:rPr lang="en-GB" b="0" i="1" smtClean="0">
+                              <a:latin typeface="Cambria Math" panose="02040503050406030204" pitchFamily="18" charset="0"/>
+                              <a:ea typeface="Cambria Math" panose="02040503050406030204" pitchFamily="18" charset="0"/>
+                            </a:rPr>
+                          </m:ctrlPr>
+                        </m:fPr>
+                        <m:num>
+                          <m:func>
+                            <m:funcPr>
+                              <m:ctrlPr>
+                                <a:rPr lang="en-GB" b="0" i="1" smtClean="0">
+                                  <a:latin typeface="Cambria Math" panose="02040503050406030204" pitchFamily="18" charset="0"/>
+                                  <a:ea typeface="Cambria Math" panose="02040503050406030204" pitchFamily="18" charset="0"/>
+                                </a:rPr>
+                              </m:ctrlPr>
+                            </m:funcPr>
+                            <m:fName>
+                              <m:sSub>
+                                <m:sSubPr>
+                                  <m:ctrlPr>
+                                    <a:rPr lang="en-GB" b="0" i="1" smtClean="0">
+                                      <a:latin typeface="Cambria Math" panose="02040503050406030204" pitchFamily="18" charset="0"/>
+                                      <a:ea typeface="Cambria Math" panose="02040503050406030204" pitchFamily="18" charset="0"/>
+                                    </a:rPr>
+                                  </m:ctrlPr>
+                                </m:sSubPr>
+                                <m:e>
+                                  <m:r>
+                                    <m:rPr>
+                                      <m:sty m:val="p"/>
+                                    </m:rPr>
+                                    <a:rPr lang="en-GB" b="0" i="0" smtClean="0">
+                                      <a:latin typeface="Cambria Math" panose="02040503050406030204" pitchFamily="18" charset="0"/>
+                                      <a:ea typeface="Cambria Math" panose="02040503050406030204" pitchFamily="18" charset="0"/>
+                                    </a:rPr>
+                                    <m:t>log</m:t>
+                                  </m:r>
+                                </m:e>
+                                <m:sub>
+                                  <m:r>
+                                    <a:rPr lang="en-GB" b="0" i="1" smtClean="0">
+                                      <a:latin typeface="Cambria Math" panose="02040503050406030204" pitchFamily="18" charset="0"/>
+                                      <a:ea typeface="Cambria Math" panose="02040503050406030204" pitchFamily="18" charset="0"/>
+                                    </a:rPr>
+                                    <m:t>2</m:t>
+                                  </m:r>
+                                </m:sub>
+                              </m:sSub>
+                            </m:fName>
+                            <m:e>
+                              <m:r>
+                                <a:rPr lang="en-GB" b="0" i="1" smtClean="0">
+                                  <a:latin typeface="Cambria Math" panose="02040503050406030204" pitchFamily="18" charset="0"/>
+                                  <a:ea typeface="Cambria Math" panose="02040503050406030204" pitchFamily="18" charset="0"/>
+                                </a:rPr>
+                                <m:t>𝑁</m:t>
+                              </m:r>
+                            </m:e>
+                          </m:func>
+                        </m:num>
+                        <m:den>
+                          <m:r>
+                            <a:rPr lang="en-GB" b="0" i="1" smtClean="0">
+                              <a:latin typeface="Cambria Math" panose="02040503050406030204" pitchFamily="18" charset="0"/>
+                              <a:ea typeface="Cambria Math" panose="02040503050406030204" pitchFamily="18" charset="0"/>
+                            </a:rPr>
+                            <m:t>4</m:t>
+                          </m:r>
+                        </m:den>
+                      </m:f>
+                    </m:oMath>
+                  </m:oMathPara>
+                </a14:m>
+                <a:endParaRPr lang="en-GB" i="1" dirty="0">
+                  <a:latin typeface="Cambria Math" panose="02040503050406030204" pitchFamily="18" charset="0"/>
+                </a:endParaRPr>
+              </a:p>
+            </p:txBody>
+          </p:sp>
+        </mc:Choice>
+        <mc:Fallback>
+          <p:sp>
+            <p:nvSpPr>
+              <p:cNvPr id="3" name="Espace réservé du contenu 2">
+                <a:extLst>
+                  <a:ext uri="{FF2B5EF4-FFF2-40B4-BE49-F238E27FC236}">
+                    <a16:creationId xmlns:a16="http://schemas.microsoft.com/office/drawing/2014/main" id="{6886910B-2FF6-2D05-3121-628D117A0D72}"/>
+                  </a:ext>
+                </a:extLst>
+              </p:cNvPr>
+              <p:cNvSpPr>
+                <a:spLocks noGrp="1" noRot="1" noChangeAspect="1" noMove="1" noResize="1" noEditPoints="1" noAdjustHandles="1" noChangeArrowheads="1" noChangeShapeType="1" noTextEdit="1"/>
+              </p:cNvSpPr>
+              <p:nvPr>
+                <p:ph idx="1"/>
+              </p:nvPr>
+            </p:nvSpPr>
+            <p:spPr>
+              <a:blipFill>
+                <a:blip r:embed="rId2"/>
+                <a:stretch>
+                  <a:fillRect/>
+                </a:stretch>
+              </a:blipFill>
+            </p:spPr>
+            <p:txBody>
+              <a:bodyPr/>
+              <a:lstStyle/>
+              <a:p>
+                <a:r>
+                  <a:rPr lang="fr-CH">
+                    <a:noFill/>
+                  </a:rPr>
+                  <a:t> </a:t>
+                </a:r>
+              </a:p>
+            </p:txBody>
+          </p:sp>
+        </mc:Fallback>
+      </mc:AlternateContent>
+      <p:pic>
+        <p:nvPicPr>
+          <p:cNvPr id="4" name="Picture 2">
+            <a:extLst>
+              <a:ext uri="{FF2B5EF4-FFF2-40B4-BE49-F238E27FC236}">
+                <a16:creationId xmlns:a16="http://schemas.microsoft.com/office/drawing/2014/main" id="{D19B3FEE-6495-0BFD-706C-12B8FB4C5635}"/>
+              </a:ext>
+            </a:extLst>
+          </p:cNvPr>
+          <p:cNvPicPr>
+            <a:picLocks noChangeAspect="1" noChangeArrowheads="1"/>
+          </p:cNvPicPr>
+          <p:nvPr/>
+        </p:nvPicPr>
+        <p:blipFill>
+          <a:blip r:embed="rId3">
+            <a:extLst>
+              <a:ext uri="{28A0092B-C50C-407E-A947-70E740481C1C}">
+                <a14:useLocalDpi xmlns:a14="http://schemas.microsoft.com/office/drawing/2010/main" val="0"/>
+              </a:ext>
+            </a:extLst>
+          </a:blip>
+          <a:srcRect/>
+          <a:stretch>
+            <a:fillRect/>
+          </a:stretch>
+        </p:blipFill>
+        <p:spPr bwMode="auto">
+          <a:xfrm>
+            <a:off x="180000" y="180000"/>
+            <a:ext cx="795955" cy="594915"/>
+          </a:xfrm>
+          <a:prstGeom prst="rect">
+            <a:avLst/>
+          </a:prstGeom>
+          <a:noFill/>
+          <a:extLst>
+            <a:ext uri="{909E8E84-426E-40DD-AFC4-6F175D3DCCD1}">
+              <a14:hiddenFill xmlns:a14="http://schemas.microsoft.com/office/drawing/2010/main">
+                <a:solidFill>
+                  <a:srgbClr val="FFFFFF"/>
+                </a:solidFill>
+              </a14:hiddenFill>
+            </a:ext>
+          </a:extLst>
+        </p:spPr>
+      </p:pic>
+    </p:spTree>
+    <p:extLst>
+      <p:ext uri="{BB962C8B-B14F-4D97-AF65-F5344CB8AC3E}">
+        <p14:creationId xmlns:p14="http://schemas.microsoft.com/office/powerpoint/2010/main" val="3399732749"/>
+      </p:ext>
+    </p:extLst>
+  </p:cSld>
+  <p:clrMapOvr>
+    <a:masterClrMapping/>
+  </p:clrMapOvr>
+</p:sld>
+</file>
+
+<file path=ppt/slides/slide36.xml><?xml version="1.0" encoding="utf-8"?>
+<p:sld xmlns:a="http://schemas.openxmlformats.org/drawingml/2006/main" xmlns:r="http://schemas.openxmlformats.org/officeDocument/2006/relationships" xmlns:p="http://schemas.openxmlformats.org/presentationml/2006/main">
+  <p:cSld>
+    <p:spTree>
+      <p:nvGrpSpPr>
         <p:cNvPr id="1" name=""/>
         <p:cNvGrpSpPr/>
         <p:nvPr/>
@@ -13461,7 +14194,7 @@
           <a:p>
             <a:r>
               <a:rPr lang="fr-CH" dirty="0"/>
-              <a:t>Mesures de protections</a:t>
+              <a:t>Mesures de mitigation</a:t>
             </a:r>
           </a:p>
         </p:txBody>
@@ -13489,53 +14222,13 @@
           <a:p>
             <a:r>
               <a:rPr lang="fr-CH" dirty="0"/>
-              <a:t>Faire les mises à jour</a:t>
+              <a:t>Augmenter la taille du hash</a:t>
             </a:r>
           </a:p>
           <a:p>
             <a:r>
               <a:rPr lang="fr-CH" dirty="0"/>
-              <a:t>Valider toutes les signatures avant de les envoyer</a:t>
-            </a:r>
-          </a:p>
-          <a:p>
-            <a:r>
-              <a:rPr lang="fr-CH" dirty="0"/>
-              <a:t>Ne pas utiliser PKCS#1 v1.5</a:t>
-            </a:r>
-          </a:p>
-          <a:p>
-            <a:r>
-              <a:rPr lang="fr-CH" dirty="0"/>
-              <a:t>Ne pas utiliser un </a:t>
-            </a:r>
-            <a:r>
-              <a:rPr lang="fr-CH" dirty="0" err="1"/>
-              <a:t>padding</a:t>
-            </a:r>
-            <a:r>
-              <a:rPr lang="fr-CH" dirty="0"/>
-              <a:t> déterministe</a:t>
-            </a:r>
-          </a:p>
-          <a:p>
-            <a:r>
-              <a:rPr lang="fr-CH" dirty="0"/>
-              <a:t>Protocole :</a:t>
-            </a:r>
-          </a:p>
-          <a:p>
-            <a:pPr lvl="1"/>
-            <a:r>
-              <a:rPr lang="fr-CH" dirty="0"/>
-              <a:t>Chiffrer la communication le plus tôt possible</a:t>
-            </a:r>
-          </a:p>
-          <a:p>
-            <a:pPr lvl="1"/>
-            <a:r>
-              <a:rPr lang="fr-CH" dirty="0"/>
-              <a:t>Se baser sur TLS 1.3</a:t>
+              <a:t>Authentifier les clients SSH par clé publique</a:t>
             </a:r>
           </a:p>
         </p:txBody>
@@ -13555,7 +14248,7 @@
           <p:nvPr/>
         </p:nvPicPr>
         <p:blipFill>
-          <a:blip r:embed="rId2">
+          <a:blip r:embed="rId3">
             <a:extLst>
               <a:ext uri="{28A0092B-C50C-407E-A947-70E740481C1C}">
                 <a14:useLocalDpi xmlns:a14="http://schemas.microsoft.com/office/drawing/2010/main" val="0"/>
@@ -13600,7 +14293,192 @@
 </p:sld>
 </file>
 
-<file path=ppt/slides/slide36.xml><?xml version="1.0" encoding="utf-8"?>
+<file path=ppt/slides/slide37.xml><?xml version="1.0" encoding="utf-8"?>
+<p:sld xmlns:a="http://schemas.openxmlformats.org/drawingml/2006/main" xmlns:r="http://schemas.openxmlformats.org/officeDocument/2006/relationships" xmlns:p="http://schemas.openxmlformats.org/presentationml/2006/main">
+  <p:cSld>
+    <p:spTree>
+      <p:nvGrpSpPr>
+        <p:cNvPr id="1" name="">
+          <a:extLst>
+            <a:ext uri="{FF2B5EF4-FFF2-40B4-BE49-F238E27FC236}">
+              <a16:creationId xmlns:a16="http://schemas.microsoft.com/office/drawing/2014/main" id="{57D8A546-43CB-C28E-F03B-CE1E32432A8F}"/>
+            </a:ext>
+          </a:extLst>
+        </p:cNvPr>
+        <p:cNvGrpSpPr/>
+        <p:nvPr/>
+      </p:nvGrpSpPr>
+      <p:grpSpPr>
+        <a:xfrm>
+          <a:off x="0" y="0"/>
+          <a:ext cx="0" cy="0"/>
+          <a:chOff x="0" y="0"/>
+          <a:chExt cx="0" cy="0"/>
+        </a:xfrm>
+      </p:grpSpPr>
+      <p:sp>
+        <p:nvSpPr>
+          <p:cNvPr id="2" name="Titre 1">
+            <a:extLst>
+              <a:ext uri="{FF2B5EF4-FFF2-40B4-BE49-F238E27FC236}">
+                <a16:creationId xmlns:a16="http://schemas.microsoft.com/office/drawing/2014/main" id="{2A954AF3-F490-59F6-B210-C766E6282905}"/>
+              </a:ext>
+            </a:extLst>
+          </p:cNvPr>
+          <p:cNvSpPr>
+            <a:spLocks noGrp="1"/>
+          </p:cNvSpPr>
+          <p:nvPr>
+            <p:ph type="title"/>
+          </p:nvPr>
+        </p:nvSpPr>
+        <p:spPr/>
+        <p:txBody>
+          <a:bodyPr/>
+          <a:lstStyle/>
+          <a:p>
+            <a:r>
+              <a:rPr lang="fr-CH" dirty="0"/>
+              <a:t>Mesures de protections</a:t>
+            </a:r>
+          </a:p>
+        </p:txBody>
+      </p:sp>
+      <p:sp>
+        <p:nvSpPr>
+          <p:cNvPr id="3" name="Espace réservé du contenu 2">
+            <a:extLst>
+              <a:ext uri="{FF2B5EF4-FFF2-40B4-BE49-F238E27FC236}">
+                <a16:creationId xmlns:a16="http://schemas.microsoft.com/office/drawing/2014/main" id="{AEE9DE27-3A0E-BB6B-1ABA-D256C7A60269}"/>
+              </a:ext>
+            </a:extLst>
+          </p:cNvPr>
+          <p:cNvSpPr>
+            <a:spLocks noGrp="1"/>
+          </p:cNvSpPr>
+          <p:nvPr>
+            <p:ph idx="1"/>
+          </p:nvPr>
+        </p:nvSpPr>
+        <p:spPr/>
+        <p:txBody>
+          <a:bodyPr/>
+          <a:lstStyle/>
+          <a:p>
+            <a:r>
+              <a:rPr lang="fr-CH" dirty="0"/>
+              <a:t>Faire les mises à jour</a:t>
+            </a:r>
+          </a:p>
+          <a:p>
+            <a:r>
+              <a:rPr lang="fr-CH" dirty="0"/>
+              <a:t>Valider toutes les signatures avant de les envoyer</a:t>
+            </a:r>
+          </a:p>
+          <a:p>
+            <a:r>
+              <a:rPr lang="fr-CH" dirty="0"/>
+              <a:t>Ne pas utiliser PKCS#1 v1.5</a:t>
+            </a:r>
+          </a:p>
+          <a:p>
+            <a:r>
+              <a:rPr lang="fr-CH" dirty="0"/>
+              <a:t>Ne pas utiliser un </a:t>
+            </a:r>
+            <a:r>
+              <a:rPr lang="fr-CH" dirty="0" err="1"/>
+              <a:t>padding</a:t>
+            </a:r>
+            <a:r>
+              <a:rPr lang="fr-CH" dirty="0"/>
+              <a:t> déterministe</a:t>
+            </a:r>
+          </a:p>
+          <a:p>
+            <a:r>
+              <a:rPr lang="fr-CH" dirty="0"/>
+              <a:t>Protocole :</a:t>
+            </a:r>
+          </a:p>
+          <a:p>
+            <a:pPr lvl="1"/>
+            <a:r>
+              <a:rPr lang="fr-CH" dirty="0"/>
+              <a:t>Chiffrer la communication le plus tôt possible</a:t>
+            </a:r>
+          </a:p>
+          <a:p>
+            <a:pPr lvl="1"/>
+            <a:r>
+              <a:rPr lang="fr-CH" dirty="0"/>
+              <a:t>Se baser sur TLS 1.3</a:t>
+            </a:r>
+          </a:p>
+        </p:txBody>
+      </p:sp>
+      <p:pic>
+        <p:nvPicPr>
+          <p:cNvPr id="4" name="Picture 2">
+            <a:extLst>
+              <a:ext uri="{FF2B5EF4-FFF2-40B4-BE49-F238E27FC236}">
+                <a16:creationId xmlns:a16="http://schemas.microsoft.com/office/drawing/2014/main" id="{D506C9F2-A69B-09B5-259D-901E7F530128}"/>
+              </a:ext>
+            </a:extLst>
+          </p:cNvPr>
+          <p:cNvPicPr>
+            <a:picLocks noChangeAspect="1" noChangeArrowheads="1"/>
+          </p:cNvPicPr>
+          <p:nvPr/>
+        </p:nvPicPr>
+        <p:blipFill>
+          <a:blip r:embed="rId3">
+            <a:extLst>
+              <a:ext uri="{28A0092B-C50C-407E-A947-70E740481C1C}">
+                <a14:useLocalDpi xmlns:a14="http://schemas.microsoft.com/office/drawing/2010/main" val="0"/>
+              </a:ext>
+            </a:extLst>
+          </a:blip>
+          <a:srcRect/>
+          <a:stretch>
+            <a:fillRect/>
+          </a:stretch>
+        </p:blipFill>
+        <p:spPr bwMode="auto">
+          <a:xfrm>
+            <a:off x="180000" y="180000"/>
+            <a:ext cx="795955" cy="594915"/>
+          </a:xfrm>
+          <a:prstGeom prst="rect">
+            <a:avLst/>
+          </a:prstGeom>
+          <a:noFill/>
+          <a:extLst>
+            <a:ext uri="{909E8E84-426E-40DD-AFC4-6F175D3DCCD1}">
+              <a14:hiddenFill xmlns:a14="http://schemas.microsoft.com/office/drawing/2010/main">
+                <a:solidFill>
+                  <a:srgbClr val="FFFFFF"/>
+                </a:solidFill>
+              </a14:hiddenFill>
+            </a:ext>
+          </a:extLst>
+        </p:spPr>
+      </p:pic>
+    </p:spTree>
+    <p:extLst>
+      <p:ext uri="{BB962C8B-B14F-4D97-AF65-F5344CB8AC3E}">
+        <p14:creationId xmlns:p14="http://schemas.microsoft.com/office/powerpoint/2010/main" val="4236297337"/>
+      </p:ext>
+    </p:extLst>
+  </p:cSld>
+  <p:clrMapOvr>
+    <a:masterClrMapping/>
+  </p:clrMapOvr>
+</p:sld>
+</file>
+
+<file path=ppt/slides/slide38.xml><?xml version="1.0" encoding="utf-8"?>
 <p:sld xmlns:a="http://schemas.openxmlformats.org/drawingml/2006/main" xmlns:r="http://schemas.openxmlformats.org/officeDocument/2006/relationships" xmlns:p="http://schemas.openxmlformats.org/presentationml/2006/main">
   <p:cSld>
     <p:spTree>
@@ -13788,7 +14666,7 @@
 </p:sld>
 </file>
 
-<file path=ppt/slides/slide37.xml><?xml version="1.0" encoding="utf-8"?>
+<file path=ppt/slides/slide39.xml><?xml version="1.0" encoding="utf-8"?>
 <p:sld xmlns:a="http://schemas.openxmlformats.org/drawingml/2006/main" xmlns:r="http://schemas.openxmlformats.org/officeDocument/2006/relationships" xmlns:p="http://schemas.openxmlformats.org/presentationml/2006/main">
   <p:cSld>
     <p:spTree>
@@ -13893,7 +14771,182 @@
 </p:sld>
 </file>
 
-<file path=ppt/slides/slide38.xml><?xml version="1.0" encoding="utf-8"?>
+<file path=ppt/slides/slide4.xml><?xml version="1.0" encoding="utf-8"?>
+<p:sld xmlns:a="http://schemas.openxmlformats.org/drawingml/2006/main" xmlns:r="http://schemas.openxmlformats.org/officeDocument/2006/relationships" xmlns:p="http://schemas.openxmlformats.org/presentationml/2006/main">
+  <p:cSld>
+    <p:spTree>
+      <p:nvGrpSpPr>
+        <p:cNvPr id="1" name=""/>
+        <p:cNvGrpSpPr/>
+        <p:nvPr/>
+      </p:nvGrpSpPr>
+      <p:grpSpPr>
+        <a:xfrm>
+          <a:off x="0" y="0"/>
+          <a:ext cx="0" cy="0"/>
+          <a:chOff x="0" y="0"/>
+          <a:chExt cx="0" cy="0"/>
+        </a:xfrm>
+      </p:grpSpPr>
+      <p:sp>
+        <p:nvSpPr>
+          <p:cNvPr id="2" name="Titre 1">
+            <a:extLst>
+              <a:ext uri="{FF2B5EF4-FFF2-40B4-BE49-F238E27FC236}">
+                <a16:creationId xmlns:a16="http://schemas.microsoft.com/office/drawing/2014/main" id="{9BEF5ACC-6579-1FC1-AB43-32A056739E01}"/>
+              </a:ext>
+            </a:extLst>
+          </p:cNvPr>
+          <p:cNvSpPr>
+            <a:spLocks noGrp="1"/>
+          </p:cNvSpPr>
+          <p:nvPr>
+            <p:ph type="title"/>
+          </p:nvPr>
+        </p:nvSpPr>
+        <p:spPr/>
+        <p:txBody>
+          <a:bodyPr/>
+          <a:lstStyle/>
+          <a:p>
+            <a:r>
+              <a:rPr lang="fr-CH" dirty="0"/>
+              <a:t>Algorithmes de signature dans SSH</a:t>
+            </a:r>
+          </a:p>
+        </p:txBody>
+      </p:sp>
+      <p:pic>
+        <p:nvPicPr>
+          <p:cNvPr id="5" name="Espace réservé du contenu 4">
+            <a:extLst>
+              <a:ext uri="{FF2B5EF4-FFF2-40B4-BE49-F238E27FC236}">
+                <a16:creationId xmlns:a16="http://schemas.microsoft.com/office/drawing/2014/main" id="{CE359A33-6DDD-E81B-A602-596D6A86F085}"/>
+              </a:ext>
+            </a:extLst>
+          </p:cNvPr>
+          <p:cNvPicPr>
+            <a:picLocks noGrp="1" noChangeAspect="1"/>
+          </p:cNvPicPr>
+          <p:nvPr>
+            <p:ph idx="1"/>
+          </p:nvPr>
+        </p:nvPicPr>
+        <p:blipFill>
+          <a:blip r:embed="rId2"/>
+          <a:srcRect l="2217" t="3797" r="1375"/>
+          <a:stretch/>
+        </p:blipFill>
+        <p:spPr>
+          <a:xfrm>
+            <a:off x="2769957" y="1690687"/>
+            <a:ext cx="6652086" cy="4186129"/>
+          </a:xfrm>
+        </p:spPr>
+      </p:pic>
+      <p:sp>
+        <p:nvSpPr>
+          <p:cNvPr id="9" name="Espace réservé du pied de page 8">
+            <a:extLst>
+              <a:ext uri="{FF2B5EF4-FFF2-40B4-BE49-F238E27FC236}">
+                <a16:creationId xmlns:a16="http://schemas.microsoft.com/office/drawing/2014/main" id="{9091359A-7C75-795F-C023-F1631195DF29}"/>
+              </a:ext>
+            </a:extLst>
+          </p:cNvPr>
+          <p:cNvSpPr>
+            <a:spLocks noGrp="1"/>
+          </p:cNvSpPr>
+          <p:nvPr>
+            <p:ph type="ftr" sz="quarter" idx="11"/>
+          </p:nvPr>
+        </p:nvSpPr>
+        <p:spPr>
+          <a:xfrm>
+            <a:off x="0" y="6356350"/>
+            <a:ext cx="8117918" cy="365125"/>
+          </a:xfrm>
+        </p:spPr>
+        <p:txBody>
+          <a:bodyPr/>
+          <a:lstStyle/>
+          <a:p>
+            <a:r>
+              <a:rPr lang="en-GB" dirty="0"/>
+              <a:t>Keegan Ryan et al. Passive SSH Key Compromise via Lattices. Cryptology </a:t>
+            </a:r>
+            <a:r>
+              <a:rPr lang="en-GB" dirty="0" err="1"/>
+              <a:t>ePrint</a:t>
+            </a:r>
+            <a:r>
+              <a:rPr lang="en-GB" dirty="0"/>
+              <a:t> Archive, Paper 2023/1711, 2023.</a:t>
+            </a:r>
+            <a:endParaRPr lang="fr-CH" dirty="0"/>
+          </a:p>
+        </p:txBody>
+      </p:sp>
+      <p:pic>
+        <p:nvPicPr>
+          <p:cNvPr id="3" name="Picture 2">
+            <a:extLst>
+              <a:ext uri="{FF2B5EF4-FFF2-40B4-BE49-F238E27FC236}">
+                <a16:creationId xmlns:a16="http://schemas.microsoft.com/office/drawing/2014/main" id="{99CF80FA-B76E-E46F-0468-E63083FD2537}"/>
+              </a:ext>
+            </a:extLst>
+          </p:cNvPr>
+          <p:cNvPicPr>
+            <a:picLocks noChangeAspect="1" noChangeArrowheads="1"/>
+          </p:cNvPicPr>
+          <p:nvPr/>
+        </p:nvPicPr>
+        <p:blipFill>
+          <a:blip r:embed="rId3">
+            <a:extLst>
+              <a:ext uri="{28A0092B-C50C-407E-A947-70E740481C1C}">
+                <a14:useLocalDpi xmlns:a14="http://schemas.microsoft.com/office/drawing/2010/main" val="0"/>
+              </a:ext>
+            </a:extLst>
+          </a:blip>
+          <a:srcRect/>
+          <a:stretch>
+            <a:fillRect/>
+          </a:stretch>
+        </p:blipFill>
+        <p:spPr bwMode="auto">
+          <a:xfrm>
+            <a:off x="180000" y="180000"/>
+            <a:ext cx="795955" cy="594915"/>
+          </a:xfrm>
+          <a:prstGeom prst="rect">
+            <a:avLst/>
+          </a:prstGeom>
+          <a:noFill/>
+          <a:extLst>
+            <a:ext uri="{909E8E84-426E-40DD-AFC4-6F175D3DCCD1}">
+              <a14:hiddenFill xmlns:a14="http://schemas.microsoft.com/office/drawing/2010/main">
+                <a:solidFill>
+                  <a:srgbClr val="FFFFFF"/>
+                </a:solidFill>
+              </a14:hiddenFill>
+            </a:ext>
+          </a:extLst>
+        </p:spPr>
+      </p:pic>
+    </p:spTree>
+    <p:extLst>
+      <p:ext uri="{BB962C8B-B14F-4D97-AF65-F5344CB8AC3E}">
+        <p14:creationId xmlns:p14="http://schemas.microsoft.com/office/powerpoint/2010/main" val="1422261801"/>
+      </p:ext>
+    </p:extLst>
+  </p:cSld>
+  <p:clrMapOvr>
+    <a:masterClrMapping/>
+  </p:clrMapOvr>
+</p:sld>
+</file>
+
+<file path=ppt/slides/slide40.xml><?xml version="1.0" encoding="utf-8"?>
 <p:sld xmlns:a="http://schemas.openxmlformats.org/drawingml/2006/main" xmlns:r="http://schemas.openxmlformats.org/officeDocument/2006/relationships" xmlns:p="http://schemas.openxmlformats.org/presentationml/2006/main">
   <p:cSld>
     <p:spTree>
@@ -14124,181 +15177,6 @@
     <p:extLst>
       <p:ext uri="{BB962C8B-B14F-4D97-AF65-F5344CB8AC3E}">
         <p14:creationId xmlns:p14="http://schemas.microsoft.com/office/powerpoint/2010/main" val="3148802735"/>
-      </p:ext>
-    </p:extLst>
-  </p:cSld>
-  <p:clrMapOvr>
-    <a:masterClrMapping/>
-  </p:clrMapOvr>
-</p:sld>
-</file>
-
-<file path=ppt/slides/slide4.xml><?xml version="1.0" encoding="utf-8"?>
-<p:sld xmlns:a="http://schemas.openxmlformats.org/drawingml/2006/main" xmlns:r="http://schemas.openxmlformats.org/officeDocument/2006/relationships" xmlns:p="http://schemas.openxmlformats.org/presentationml/2006/main">
-  <p:cSld>
-    <p:spTree>
-      <p:nvGrpSpPr>
-        <p:cNvPr id="1" name=""/>
-        <p:cNvGrpSpPr/>
-        <p:nvPr/>
-      </p:nvGrpSpPr>
-      <p:grpSpPr>
-        <a:xfrm>
-          <a:off x="0" y="0"/>
-          <a:ext cx="0" cy="0"/>
-          <a:chOff x="0" y="0"/>
-          <a:chExt cx="0" cy="0"/>
-        </a:xfrm>
-      </p:grpSpPr>
-      <p:sp>
-        <p:nvSpPr>
-          <p:cNvPr id="2" name="Titre 1">
-            <a:extLst>
-              <a:ext uri="{FF2B5EF4-FFF2-40B4-BE49-F238E27FC236}">
-                <a16:creationId xmlns:a16="http://schemas.microsoft.com/office/drawing/2014/main" id="{9BEF5ACC-6579-1FC1-AB43-32A056739E01}"/>
-              </a:ext>
-            </a:extLst>
-          </p:cNvPr>
-          <p:cNvSpPr>
-            <a:spLocks noGrp="1"/>
-          </p:cNvSpPr>
-          <p:nvPr>
-            <p:ph type="title"/>
-          </p:nvPr>
-        </p:nvSpPr>
-        <p:spPr/>
-        <p:txBody>
-          <a:bodyPr/>
-          <a:lstStyle/>
-          <a:p>
-            <a:r>
-              <a:rPr lang="fr-CH" dirty="0"/>
-              <a:t>Algorithmes de signature dans SSH</a:t>
-            </a:r>
-          </a:p>
-        </p:txBody>
-      </p:sp>
-      <p:pic>
-        <p:nvPicPr>
-          <p:cNvPr id="5" name="Espace réservé du contenu 4">
-            <a:extLst>
-              <a:ext uri="{FF2B5EF4-FFF2-40B4-BE49-F238E27FC236}">
-                <a16:creationId xmlns:a16="http://schemas.microsoft.com/office/drawing/2014/main" id="{CE359A33-6DDD-E81B-A602-596D6A86F085}"/>
-              </a:ext>
-            </a:extLst>
-          </p:cNvPr>
-          <p:cNvPicPr>
-            <a:picLocks noGrp="1" noChangeAspect="1"/>
-          </p:cNvPicPr>
-          <p:nvPr>
-            <p:ph idx="1"/>
-          </p:nvPr>
-        </p:nvPicPr>
-        <p:blipFill>
-          <a:blip r:embed="rId2"/>
-          <a:srcRect l="2217" t="3797" r="1375"/>
-          <a:stretch/>
-        </p:blipFill>
-        <p:spPr>
-          <a:xfrm>
-            <a:off x="2769957" y="1690687"/>
-            <a:ext cx="6652086" cy="4186129"/>
-          </a:xfrm>
-        </p:spPr>
-      </p:pic>
-      <p:sp>
-        <p:nvSpPr>
-          <p:cNvPr id="9" name="Espace réservé du pied de page 8">
-            <a:extLst>
-              <a:ext uri="{FF2B5EF4-FFF2-40B4-BE49-F238E27FC236}">
-                <a16:creationId xmlns:a16="http://schemas.microsoft.com/office/drawing/2014/main" id="{9091359A-7C75-795F-C023-F1631195DF29}"/>
-              </a:ext>
-            </a:extLst>
-          </p:cNvPr>
-          <p:cNvSpPr>
-            <a:spLocks noGrp="1"/>
-          </p:cNvSpPr>
-          <p:nvPr>
-            <p:ph type="ftr" sz="quarter" idx="11"/>
-          </p:nvPr>
-        </p:nvSpPr>
-        <p:spPr>
-          <a:xfrm>
-            <a:off x="0" y="6356350"/>
-            <a:ext cx="8117918" cy="365125"/>
-          </a:xfrm>
-        </p:spPr>
-        <p:txBody>
-          <a:bodyPr/>
-          <a:lstStyle/>
-          <a:p>
-            <a:r>
-              <a:rPr lang="en-GB" dirty="0"/>
-              <a:t>Keegan Ryan et al. Passive SSH Key Compromise via Lattices. Cryptology </a:t>
-            </a:r>
-            <a:r>
-              <a:rPr lang="en-GB" dirty="0" err="1"/>
-              <a:t>ePrint</a:t>
-            </a:r>
-            <a:r>
-              <a:rPr lang="en-GB" dirty="0"/>
-              <a:t> Archive, Paper 2023/1711, 2023.</a:t>
-            </a:r>
-            <a:endParaRPr lang="fr-CH" dirty="0"/>
-          </a:p>
-        </p:txBody>
-      </p:sp>
-      <p:pic>
-        <p:nvPicPr>
-          <p:cNvPr id="3" name="Picture 2">
-            <a:extLst>
-              <a:ext uri="{FF2B5EF4-FFF2-40B4-BE49-F238E27FC236}">
-                <a16:creationId xmlns:a16="http://schemas.microsoft.com/office/drawing/2014/main" id="{99CF80FA-B76E-E46F-0468-E63083FD2537}"/>
-              </a:ext>
-            </a:extLst>
-          </p:cNvPr>
-          <p:cNvPicPr>
-            <a:picLocks noChangeAspect="1" noChangeArrowheads="1"/>
-          </p:cNvPicPr>
-          <p:nvPr/>
-        </p:nvPicPr>
-        <p:blipFill>
-          <a:blip r:embed="rId3">
-            <a:extLst>
-              <a:ext uri="{28A0092B-C50C-407E-A947-70E740481C1C}">
-                <a14:useLocalDpi xmlns:a14="http://schemas.microsoft.com/office/drawing/2010/main" val="0"/>
-              </a:ext>
-            </a:extLst>
-          </a:blip>
-          <a:srcRect/>
-          <a:stretch>
-            <a:fillRect/>
-          </a:stretch>
-        </p:blipFill>
-        <p:spPr bwMode="auto">
-          <a:xfrm>
-            <a:off x="180000" y="180000"/>
-            <a:ext cx="795955" cy="594915"/>
-          </a:xfrm>
-          <a:prstGeom prst="rect">
-            <a:avLst/>
-          </a:prstGeom>
-          <a:noFill/>
-          <a:extLst>
-            <a:ext uri="{909E8E84-426E-40DD-AFC4-6F175D3DCCD1}">
-              <a14:hiddenFill xmlns:a14="http://schemas.microsoft.com/office/drawing/2010/main">
-                <a:solidFill>
-                  <a:srgbClr val="FFFFFF"/>
-                </a:solidFill>
-              </a14:hiddenFill>
-            </a:ext>
-          </a:extLst>
-        </p:spPr>
-      </p:pic>
-    </p:spTree>
-    <p:extLst>
-      <p:ext uri="{BB962C8B-B14F-4D97-AF65-F5344CB8AC3E}">
-        <p14:creationId xmlns:p14="http://schemas.microsoft.com/office/powerpoint/2010/main" val="1422261801"/>
       </p:ext>
     </p:extLst>
   </p:cSld>

</xml_diff>